<commit_message>
creazione repository User, Project e Task
Aggiornato il class diagram con politiche di fetch e cascade e creati i repository nel sommario
</commit_message>
<xml_diff>
--- a/Direttive progetto e class diagram/Class diagram.pptx
+++ b/Direttive progetto e class diagram/Class diagram.pptx
@@ -5561,7 +5561,95 @@
         </p:nvSpPr>
         <p:spPr>
           <a:xfrm>
-            <a:off x="8815900" y="2198275"/>
+            <a:off x="8801025" y="2891460"/>
+            <a:ext cx="807072" cy="246221"/>
+          </a:xfrm>
+          <a:prstGeom prst="rect">
+            <a:avLst/>
+          </a:prstGeom>
+          <a:noFill/>
+        </p:spPr>
+        <p:txBody>
+          <a:bodyPr wrap="square" rtlCol="0">
+            <a:spAutoFit/>
+          </a:bodyPr>
+          <a:lstStyle/>
+          <a:p>
+            <a:r>
+              <a:rPr lang="it-IT" sz="1000" dirty="0" err="1"/>
+              <a:t>Fetch</a:t>
+            </a:r>
+            <a:r>
+              <a:rPr lang="it-IT" sz="1000" dirty="0"/>
+              <a:t>: LAZY</a:t>
+            </a:r>
+          </a:p>
+        </p:txBody>
+      </p:sp>
+      <p:sp>
+        <p:nvSpPr>
+          <p:cNvPr id="41" name="CasellaDiTesto 40">
+            <a:extLst>
+              <a:ext uri="{FF2B5EF4-FFF2-40B4-BE49-F238E27FC236}">
+                <a16:creationId xmlns:a16="http://schemas.microsoft.com/office/drawing/2014/main" id="{C1FAF119-BA30-4D2C-B7D4-191E60785F41}"/>
+              </a:ext>
+            </a:extLst>
+          </p:cNvPr>
+          <p:cNvSpPr txBox="1"/>
+          <p:nvPr/>
+        </p:nvSpPr>
+        <p:spPr>
+          <a:xfrm>
+            <a:off x="8096964" y="4787795"/>
+            <a:ext cx="1354747" cy="461665"/>
+          </a:xfrm>
+          <a:prstGeom prst="rect">
+            <a:avLst/>
+          </a:prstGeom>
+          <a:noFill/>
+        </p:spPr>
+        <p:txBody>
+          <a:bodyPr wrap="square" rtlCol="0">
+            <a:spAutoFit/>
+          </a:bodyPr>
+          <a:lstStyle/>
+          <a:p>
+            <a:r>
+              <a:rPr lang="it-IT" sz="1200" dirty="0" err="1"/>
+              <a:t>Fetch</a:t>
+            </a:r>
+            <a:r>
+              <a:rPr lang="it-IT" sz="1200" dirty="0"/>
+              <a:t>: LAZY</a:t>
+            </a:r>
+          </a:p>
+          <a:p>
+            <a:r>
+              <a:rPr lang="it-IT" sz="1200" dirty="0" err="1"/>
+              <a:t>Cascade</a:t>
+            </a:r>
+            <a:r>
+              <a:rPr lang="it-IT" sz="1200" dirty="0"/>
+              <a:t>: REMOVE</a:t>
+            </a:r>
+          </a:p>
+        </p:txBody>
+      </p:sp>
+      <p:sp>
+        <p:nvSpPr>
+          <p:cNvPr id="42" name="CasellaDiTesto 41">
+            <a:extLst>
+              <a:ext uri="{FF2B5EF4-FFF2-40B4-BE49-F238E27FC236}">
+                <a16:creationId xmlns:a16="http://schemas.microsoft.com/office/drawing/2014/main" id="{799C4C90-F419-4ECF-8BEF-5DD62646AEC0}"/>
+              </a:ext>
+            </a:extLst>
+          </p:cNvPr>
+          <p:cNvSpPr txBox="1"/>
+          <p:nvPr/>
+        </p:nvSpPr>
+        <p:spPr>
+          <a:xfrm>
+            <a:off x="8511674" y="2074391"/>
             <a:ext cx="807072" cy="246221"/>
           </a:xfrm>
           <a:prstGeom prst="rect">

</xml_diff>

<commit_message>
integrato con Entity e Repository Credentials
</commit_message>
<xml_diff>
--- a/Direttive progetto e class diagram/Class diagram.pptx
+++ b/Direttive progetto e class diagram/Class diagram.pptx
@@ -259,7 +259,7 @@
           <a:p>
             <a:fld id="{BC950935-8A9F-4F21-92D4-F794199662FA}" type="datetimeFigureOut">
               <a:rPr lang="it-IT" smtClean="0"/>
-              <a:t>02/06/2020</a:t>
+              <a:t>04/06/2020</a:t>
             </a:fld>
             <a:endParaRPr lang="it-IT"/>
           </a:p>
@@ -457,7 +457,7 @@
           <a:p>
             <a:fld id="{BC950935-8A9F-4F21-92D4-F794199662FA}" type="datetimeFigureOut">
               <a:rPr lang="it-IT" smtClean="0"/>
-              <a:t>02/06/2020</a:t>
+              <a:t>04/06/2020</a:t>
             </a:fld>
             <a:endParaRPr lang="it-IT"/>
           </a:p>
@@ -665,7 +665,7 @@
           <a:p>
             <a:fld id="{BC950935-8A9F-4F21-92D4-F794199662FA}" type="datetimeFigureOut">
               <a:rPr lang="it-IT" smtClean="0"/>
-              <a:t>02/06/2020</a:t>
+              <a:t>04/06/2020</a:t>
             </a:fld>
             <a:endParaRPr lang="it-IT"/>
           </a:p>
@@ -863,7 +863,7 @@
           <a:p>
             <a:fld id="{BC950935-8A9F-4F21-92D4-F794199662FA}" type="datetimeFigureOut">
               <a:rPr lang="it-IT" smtClean="0"/>
-              <a:t>02/06/2020</a:t>
+              <a:t>04/06/2020</a:t>
             </a:fld>
             <a:endParaRPr lang="it-IT"/>
           </a:p>
@@ -1138,7 +1138,7 @@
           <a:p>
             <a:fld id="{BC950935-8A9F-4F21-92D4-F794199662FA}" type="datetimeFigureOut">
               <a:rPr lang="it-IT" smtClean="0"/>
-              <a:t>02/06/2020</a:t>
+              <a:t>04/06/2020</a:t>
             </a:fld>
             <a:endParaRPr lang="it-IT"/>
           </a:p>
@@ -1403,7 +1403,7 @@
           <a:p>
             <a:fld id="{BC950935-8A9F-4F21-92D4-F794199662FA}" type="datetimeFigureOut">
               <a:rPr lang="it-IT" smtClean="0"/>
-              <a:t>02/06/2020</a:t>
+              <a:t>04/06/2020</a:t>
             </a:fld>
             <a:endParaRPr lang="it-IT"/>
           </a:p>
@@ -1815,7 +1815,7 @@
           <a:p>
             <a:fld id="{BC950935-8A9F-4F21-92D4-F794199662FA}" type="datetimeFigureOut">
               <a:rPr lang="it-IT" smtClean="0"/>
-              <a:t>02/06/2020</a:t>
+              <a:t>04/06/2020</a:t>
             </a:fld>
             <a:endParaRPr lang="it-IT"/>
           </a:p>
@@ -1956,7 +1956,7 @@
           <a:p>
             <a:fld id="{BC950935-8A9F-4F21-92D4-F794199662FA}" type="datetimeFigureOut">
               <a:rPr lang="it-IT" smtClean="0"/>
-              <a:t>02/06/2020</a:t>
+              <a:t>04/06/2020</a:t>
             </a:fld>
             <a:endParaRPr lang="it-IT"/>
           </a:p>
@@ -2069,7 +2069,7 @@
           <a:p>
             <a:fld id="{BC950935-8A9F-4F21-92D4-F794199662FA}" type="datetimeFigureOut">
               <a:rPr lang="it-IT" smtClean="0"/>
-              <a:t>02/06/2020</a:t>
+              <a:t>04/06/2020</a:t>
             </a:fld>
             <a:endParaRPr lang="it-IT"/>
           </a:p>
@@ -2380,7 +2380,7 @@
           <a:p>
             <a:fld id="{BC950935-8A9F-4F21-92D4-F794199662FA}" type="datetimeFigureOut">
               <a:rPr lang="it-IT" smtClean="0"/>
-              <a:t>02/06/2020</a:t>
+              <a:t>04/06/2020</a:t>
             </a:fld>
             <a:endParaRPr lang="it-IT"/>
           </a:p>
@@ -2668,7 +2668,7 @@
           <a:p>
             <a:fld id="{BC950935-8A9F-4F21-92D4-F794199662FA}" type="datetimeFigureOut">
               <a:rPr lang="it-IT" smtClean="0"/>
-              <a:t>02/06/2020</a:t>
+              <a:t>04/06/2020</a:t>
             </a:fld>
             <a:endParaRPr lang="it-IT"/>
           </a:p>
@@ -2909,7 +2909,7 @@
           <a:p>
             <a:fld id="{BC950935-8A9F-4F21-92D4-F794199662FA}" type="datetimeFigureOut">
               <a:rPr lang="it-IT" smtClean="0"/>
-              <a:t>02/06/2020</a:t>
+              <a:t>04/06/2020</a:t>
             </a:fld>
             <a:endParaRPr lang="it-IT"/>
           </a:p>
@@ -3338,7 +3338,7 @@
         </p:nvSpPr>
         <p:spPr>
           <a:xfrm>
-            <a:off x="694548" y="226559"/>
+            <a:off x="664549" y="86839"/>
             <a:ext cx="10515600" cy="1325563"/>
           </a:xfrm>
         </p:spPr>
@@ -3389,13 +3389,13 @@
           <p:nvPr>
             <p:extLst>
               <p:ext uri="{D42A27DB-BD31-4B8C-83A1-F6EECF244321}">
-                <p14:modId xmlns:p14="http://schemas.microsoft.com/office/powerpoint/2010/main" val="2177496310"/>
+                <p14:modId xmlns:p14="http://schemas.microsoft.com/office/powerpoint/2010/main" val="525754892"/>
               </p:ext>
             </p:extLst>
           </p:nvPr>
         </p:nvGraphicFramePr>
         <p:xfrm>
-          <a:off x="694548" y="1995616"/>
+          <a:off x="1160026" y="2974599"/>
           <a:ext cx="1699756" cy="1511761"/>
         </p:xfrm>
         <a:graphic>
@@ -3615,13 +3615,13 @@
           <p:nvPr>
             <p:extLst>
               <p:ext uri="{D42A27DB-BD31-4B8C-83A1-F6EECF244321}">
-                <p14:modId xmlns:p14="http://schemas.microsoft.com/office/powerpoint/2010/main" val="1484204625"/>
+                <p14:modId xmlns:p14="http://schemas.microsoft.com/office/powerpoint/2010/main" val="210244991"/>
               </p:ext>
             </p:extLst>
           </p:nvPr>
         </p:nvGraphicFramePr>
         <p:xfrm>
-          <a:off x="3864884" y="2085467"/>
+          <a:off x="4330362" y="3064450"/>
           <a:ext cx="2015719" cy="1191721"/>
         </p:xfrm>
         <a:graphic>
@@ -3806,13 +3806,13 @@
           <p:nvPr>
             <p:extLst>
               <p:ext uri="{D42A27DB-BD31-4B8C-83A1-F6EECF244321}">
-                <p14:modId xmlns:p14="http://schemas.microsoft.com/office/powerpoint/2010/main" val="3814287047"/>
+                <p14:modId xmlns:p14="http://schemas.microsoft.com/office/powerpoint/2010/main" val="3894864459"/>
               </p:ext>
             </p:extLst>
           </p:nvPr>
         </p:nvGraphicFramePr>
         <p:xfrm>
-          <a:off x="6811520" y="2074392"/>
+          <a:off x="7276998" y="3053375"/>
           <a:ext cx="1699756" cy="1191721"/>
         </p:xfrm>
         <a:graphic>
@@ -3999,7 +3999,7 @@
         </p:nvSpPr>
         <p:spPr>
           <a:xfrm>
-            <a:off x="3325221" y="2785618"/>
+            <a:off x="3790699" y="3764601"/>
             <a:ext cx="533169" cy="369332"/>
           </a:xfrm>
           <a:prstGeom prst="rect">
@@ -4042,7 +4042,7 @@
         </p:nvCxnSpPr>
         <p:spPr>
           <a:xfrm>
-            <a:off x="5880603" y="2841348"/>
+            <a:off x="6346081" y="3820331"/>
             <a:ext cx="930917" cy="0"/>
           </a:xfrm>
           <a:prstGeom prst="straightConnector1">
@@ -4086,7 +4086,7 @@
         </p:nvSpPr>
         <p:spPr>
           <a:xfrm>
-            <a:off x="6346061" y="2472016"/>
+            <a:off x="6811539" y="3450999"/>
             <a:ext cx="533169" cy="369332"/>
           </a:xfrm>
           <a:prstGeom prst="rect">
@@ -4130,7 +4130,7 @@
         </p:nvCxnSpPr>
         <p:spPr>
           <a:xfrm flipV="1">
-            <a:off x="1544426" y="3507377"/>
+            <a:off x="2009904" y="4486360"/>
             <a:ext cx="0" cy="1690680"/>
           </a:xfrm>
           <a:prstGeom prst="straightConnector1">
@@ -4177,7 +4177,7 @@
         </p:nvCxnSpPr>
         <p:spPr>
           <a:xfrm flipH="1">
-            <a:off x="7653010" y="3266113"/>
+            <a:off x="8118488" y="4245096"/>
             <a:ext cx="8388" cy="1931941"/>
           </a:xfrm>
           <a:prstGeom prst="line">
@@ -4215,7 +4215,7 @@
         </p:nvCxnSpPr>
         <p:spPr>
           <a:xfrm flipH="1">
-            <a:off x="1544426" y="5198054"/>
+            <a:off x="2009904" y="6177037"/>
             <a:ext cx="6108583" cy="0"/>
           </a:xfrm>
           <a:prstGeom prst="line">
@@ -4251,7 +4251,7 @@
         </p:nvSpPr>
         <p:spPr>
           <a:xfrm>
-            <a:off x="2743898" y="2785618"/>
+            <a:off x="3209376" y="3764601"/>
             <a:ext cx="651044" cy="307777"/>
           </a:xfrm>
           <a:prstGeom prst="rect">
@@ -4289,7 +4289,7 @@
         </p:nvCxnSpPr>
         <p:spPr>
           <a:xfrm>
-            <a:off x="2394304" y="3098199"/>
+            <a:off x="2859782" y="4077182"/>
             <a:ext cx="1470580" cy="1"/>
           </a:xfrm>
           <a:prstGeom prst="straightConnector1">
@@ -4329,7 +4329,7 @@
         </p:nvSpPr>
         <p:spPr>
           <a:xfrm>
-            <a:off x="2360449" y="2751496"/>
+            <a:off x="1866962" y="2644994"/>
             <a:ext cx="301686" cy="369332"/>
           </a:xfrm>
           <a:prstGeom prst="rect">
@@ -4370,7 +4370,7 @@
         </p:nvSpPr>
         <p:spPr>
           <a:xfrm>
-            <a:off x="2692997" y="2099846"/>
+            <a:off x="3158475" y="3078829"/>
             <a:ext cx="845260" cy="307777"/>
           </a:xfrm>
           <a:prstGeom prst="rect">
@@ -4406,7 +4406,7 @@
         </p:nvSpPr>
         <p:spPr>
           <a:xfrm>
-            <a:off x="3394942" y="2081411"/>
+            <a:off x="3860420" y="3060394"/>
             <a:ext cx="533169" cy="369332"/>
           </a:xfrm>
           <a:prstGeom prst="rect">
@@ -4447,7 +4447,7 @@
         </p:nvSpPr>
         <p:spPr>
           <a:xfrm>
-            <a:off x="2360449" y="2075164"/>
+            <a:off x="2825927" y="3054147"/>
             <a:ext cx="533169" cy="369332"/>
           </a:xfrm>
           <a:prstGeom prst="rect">
@@ -4488,7 +4488,7 @@
         </p:nvCxnSpPr>
         <p:spPr>
           <a:xfrm>
-            <a:off x="2394304" y="2472016"/>
+            <a:off x="2859782" y="3450999"/>
             <a:ext cx="1464086" cy="0"/>
           </a:xfrm>
           <a:prstGeom prst="straightConnector1">
@@ -4529,13 +4529,13 @@
           <p:nvPr>
             <p:extLst>
               <p:ext uri="{D42A27DB-BD31-4B8C-83A1-F6EECF244321}">
-                <p14:modId xmlns:p14="http://schemas.microsoft.com/office/powerpoint/2010/main" val="3979308551"/>
+                <p14:modId xmlns:p14="http://schemas.microsoft.com/office/powerpoint/2010/main" val="614086134"/>
               </p:ext>
             </p:extLst>
           </p:nvPr>
         </p:nvGraphicFramePr>
         <p:xfrm>
-          <a:off x="9622971" y="2074391"/>
+          <a:off x="10088449" y="3053374"/>
           <a:ext cx="1673475" cy="1191721"/>
         </p:xfrm>
         <a:graphic>
@@ -4731,7 +4731,7 @@
         </p:nvCxnSpPr>
         <p:spPr>
           <a:xfrm>
-            <a:off x="8511276" y="2785618"/>
+            <a:off x="8976754" y="3764601"/>
             <a:ext cx="1068153" cy="0"/>
           </a:xfrm>
           <a:prstGeom prst="straightConnector1">
@@ -4771,7 +4771,7 @@
         </p:nvSpPr>
         <p:spPr>
           <a:xfrm>
-            <a:off x="9089802" y="2431379"/>
+            <a:off x="9555280" y="3410362"/>
             <a:ext cx="533169" cy="369332"/>
           </a:xfrm>
           <a:prstGeom prst="rect">
@@ -4812,7 +4812,7 @@
         </p:nvSpPr>
         <p:spPr>
           <a:xfrm>
-            <a:off x="8525782" y="2431379"/>
+            <a:off x="8991260" y="3410362"/>
             <a:ext cx="533169" cy="369332"/>
           </a:xfrm>
           <a:prstGeom prst="rect">
@@ -4854,13 +4854,13 @@
           <p:nvPr>
             <p:extLst>
               <p:ext uri="{D42A27DB-BD31-4B8C-83A1-F6EECF244321}">
-                <p14:modId xmlns:p14="http://schemas.microsoft.com/office/powerpoint/2010/main" val="4087342367"/>
+                <p14:modId xmlns:p14="http://schemas.microsoft.com/office/powerpoint/2010/main" val="2551612766"/>
               </p:ext>
             </p:extLst>
           </p:nvPr>
         </p:nvGraphicFramePr>
         <p:xfrm>
-          <a:off x="8792366" y="5439720"/>
+          <a:off x="9208169" y="5397208"/>
           <a:ext cx="1673475" cy="871681"/>
         </p:xfrm>
         <a:graphic>
@@ -5013,7 +5013,7 @@
         </p:nvCxnSpPr>
         <p:spPr>
           <a:xfrm>
-            <a:off x="8511276" y="3152773"/>
+            <a:off x="8976754" y="4131756"/>
             <a:ext cx="940435" cy="0"/>
           </a:xfrm>
           <a:prstGeom prst="line">
@@ -5050,9 +5050,9 @@
           <p:nvPr/>
         </p:nvCxnSpPr>
         <p:spPr>
-          <a:xfrm>
-            <a:off x="9451711" y="3152773"/>
-            <a:ext cx="14506" cy="2194290"/>
+          <a:xfrm flipH="1">
+            <a:off x="9907613" y="4131756"/>
+            <a:ext cx="9576" cy="1225006"/>
           </a:xfrm>
           <a:prstGeom prst="straightConnector1">
             <a:avLst/>
@@ -5090,7 +5090,7 @@
         </p:nvSpPr>
         <p:spPr>
           <a:xfrm>
-            <a:off x="9466216" y="4951892"/>
+            <a:off x="9882019" y="4868934"/>
             <a:ext cx="533169" cy="369332"/>
           </a:xfrm>
           <a:prstGeom prst="rect">
@@ -5131,7 +5131,7 @@
         </p:nvCxnSpPr>
         <p:spPr>
           <a:xfrm flipV="1">
-            <a:off x="5529943" y="1698171"/>
+            <a:off x="5995421" y="2677154"/>
             <a:ext cx="0" cy="376220"/>
           </a:xfrm>
           <a:prstGeom prst="line">
@@ -5169,7 +5169,7 @@
         </p:nvCxnSpPr>
         <p:spPr>
           <a:xfrm>
-            <a:off x="5529943" y="1698171"/>
+            <a:off x="5995421" y="2677154"/>
             <a:ext cx="4929765" cy="0"/>
           </a:xfrm>
           <a:prstGeom prst="line">
@@ -5205,7 +5205,7 @@
         </p:nvCxnSpPr>
         <p:spPr>
           <a:xfrm>
-            <a:off x="10459708" y="1698171"/>
+            <a:off x="10925186" y="2677154"/>
             <a:ext cx="0" cy="297445"/>
           </a:xfrm>
           <a:prstGeom prst="straightConnector1">
@@ -5244,7 +5244,7 @@
         </p:nvSpPr>
         <p:spPr>
           <a:xfrm>
-            <a:off x="10600740" y="1698171"/>
+            <a:off x="11066218" y="2677154"/>
             <a:ext cx="533169" cy="369332"/>
           </a:xfrm>
           <a:prstGeom prst="rect">
@@ -5285,7 +5285,7 @@
         </p:nvSpPr>
         <p:spPr>
           <a:xfrm>
-            <a:off x="3483467" y="1798165"/>
+            <a:off x="3487271" y="3462076"/>
             <a:ext cx="1354747" cy="461665"/>
           </a:xfrm>
           <a:prstGeom prst="rect">
@@ -5327,7 +5327,7 @@
         </p:nvSpPr>
         <p:spPr>
           <a:xfrm>
-            <a:off x="3333553" y="3274017"/>
+            <a:off x="3799031" y="4253000"/>
             <a:ext cx="1354747" cy="461665"/>
           </a:xfrm>
           <a:prstGeom prst="rect">
@@ -5376,7 +5376,7 @@
         </p:nvSpPr>
         <p:spPr>
           <a:xfrm>
-            <a:off x="2002854" y="1705738"/>
+            <a:off x="2800596" y="2888632"/>
             <a:ext cx="1354747" cy="461665"/>
           </a:xfrm>
           <a:prstGeom prst="rect">
@@ -5418,7 +5418,7 @@
         </p:nvSpPr>
         <p:spPr>
           <a:xfrm>
-            <a:off x="2015623" y="3550299"/>
+            <a:off x="2818946" y="4120538"/>
             <a:ext cx="1354747" cy="461665"/>
           </a:xfrm>
           <a:prstGeom prst="rect">
@@ -5460,7 +5460,7 @@
         </p:nvSpPr>
         <p:spPr>
           <a:xfrm>
-            <a:off x="5924145" y="3210680"/>
+            <a:off x="6389623" y="4189663"/>
             <a:ext cx="1354747" cy="646331"/>
           </a:xfrm>
           <a:prstGeom prst="rect">
@@ -5512,7 +5512,7 @@
         </p:nvSpPr>
         <p:spPr>
           <a:xfrm>
-            <a:off x="10530453" y="1351591"/>
+            <a:off x="10520530" y="2071374"/>
             <a:ext cx="1354747" cy="461665"/>
           </a:xfrm>
           <a:prstGeom prst="rect">
@@ -5561,7 +5561,7 @@
         </p:nvSpPr>
         <p:spPr>
           <a:xfrm>
-            <a:off x="8801025" y="2891460"/>
+            <a:off x="9266503" y="3870443"/>
             <a:ext cx="807072" cy="246221"/>
           </a:xfrm>
           <a:prstGeom prst="rect">
@@ -5600,7 +5600,7 @@
         </p:nvSpPr>
         <p:spPr>
           <a:xfrm>
-            <a:off x="8096964" y="4787795"/>
+            <a:off x="8589129" y="4867140"/>
             <a:ext cx="1354747" cy="461665"/>
           </a:xfrm>
           <a:prstGeom prst="rect">
@@ -5649,7 +5649,7 @@
         </p:nvSpPr>
         <p:spPr>
           <a:xfrm>
-            <a:off x="8511674" y="2074391"/>
+            <a:off x="8977152" y="3053374"/>
             <a:ext cx="807072" cy="246221"/>
           </a:xfrm>
           <a:prstGeom prst="rect">
@@ -5671,6 +5671,348 @@
               <a:rPr lang="it-IT" sz="1000" dirty="0"/>
               <a:t>: LAZY</a:t>
             </a:r>
+          </a:p>
+        </p:txBody>
+      </p:sp>
+      <p:graphicFrame>
+        <p:nvGraphicFramePr>
+          <p:cNvPr id="43" name="Segnaposto contenuto 5">
+            <a:extLst>
+              <a:ext uri="{FF2B5EF4-FFF2-40B4-BE49-F238E27FC236}">
+                <a16:creationId xmlns:a16="http://schemas.microsoft.com/office/drawing/2014/main" id="{07ED764F-455F-4CAF-8E9B-E2969AD4DF11}"/>
+              </a:ext>
+            </a:extLst>
+          </p:cNvPr>
+          <p:cNvGraphicFramePr>
+            <a:graphicFrameLocks/>
+          </p:cNvGraphicFramePr>
+          <p:nvPr>
+            <p:extLst>
+              <p:ext uri="{D42A27DB-BD31-4B8C-83A1-F6EECF244321}">
+                <p14:modId xmlns:p14="http://schemas.microsoft.com/office/powerpoint/2010/main" val="2887440010"/>
+              </p:ext>
+            </p:extLst>
+          </p:nvPr>
+        </p:nvGraphicFramePr>
+        <p:xfrm>
+          <a:off x="1160025" y="1184616"/>
+          <a:ext cx="1699757" cy="1297733"/>
+        </p:xfrm>
+        <a:graphic>
+          <a:graphicData uri="http://schemas.openxmlformats.org/drawingml/2006/table">
+            <a:tbl>
+              <a:tblPr firstRow="1" bandRow="1">
+                <a:tableStyleId>{5C22544A-7EE6-4342-B048-85BDC9FD1C3A}</a:tableStyleId>
+              </a:tblPr>
+              <a:tblGrid>
+                <a:gridCol w="1699757">
+                  <a:extLst>
+                    <a:ext uri="{9D8B030D-6E8A-4147-A177-3AD203B41FA5}">
+                      <a16:colId xmlns:a16="http://schemas.microsoft.com/office/drawing/2014/main" val="20000"/>
+                    </a:ext>
+                  </a:extLst>
+                </a:gridCol>
+              </a:tblGrid>
+              <a:tr h="406193">
+                <a:tc>
+                  <a:txBody>
+                    <a:bodyPr/>
+                    <a:lstStyle/>
+                    <a:p>
+                      <a:pPr algn="ctr"/>
+                      <a:r>
+                        <a:rPr lang="it-IT" sz="1800" dirty="0" err="1"/>
+                        <a:t>Credentials</a:t>
+                      </a:r>
+                      <a:endParaRPr lang="it-IT" sz="1050" dirty="0"/>
+                    </a:p>
+                  </a:txBody>
+                  <a:tcPr>
+                    <a:lnL w="12700" cap="flat" cmpd="sng" algn="ctr">
+                      <a:solidFill>
+                        <a:scrgbClr r="0" g="0" b="0"/>
+                      </a:solidFill>
+                      <a:prstDash val="solid"/>
+                      <a:round/>
+                      <a:headEnd type="none" w="med" len="med"/>
+                      <a:tailEnd type="none" w="med" len="med"/>
+                    </a:lnL>
+                    <a:lnR w="12700" cap="flat" cmpd="sng" algn="ctr">
+                      <a:solidFill>
+                        <a:scrgbClr r="0" g="0" b="0"/>
+                      </a:solidFill>
+                      <a:prstDash val="solid"/>
+                      <a:round/>
+                      <a:headEnd type="none" w="med" len="med"/>
+                      <a:tailEnd type="none" w="med" len="med"/>
+                    </a:lnR>
+                    <a:lnT w="12700" cap="flat" cmpd="sng" algn="ctr">
+                      <a:solidFill>
+                        <a:scrgbClr r="0" g="0" b="0"/>
+                      </a:solidFill>
+                      <a:prstDash val="solid"/>
+                      <a:round/>
+                      <a:headEnd type="none" w="med" len="med"/>
+                      <a:tailEnd type="none" w="med" len="med"/>
+                    </a:lnT>
+                  </a:tcPr>
+                </a:tc>
+                <a:extLst>
+                  <a:ext uri="{0D108BD9-81ED-4DB2-BD59-A6C34878D82A}">
+                    <a16:rowId xmlns:a16="http://schemas.microsoft.com/office/drawing/2014/main" val="10000"/>
+                  </a:ext>
+                </a:extLst>
+              </a:tr>
+              <a:tr h="786912">
+                <a:tc>
+                  <a:txBody>
+                    <a:bodyPr/>
+                    <a:lstStyle/>
+                    <a:p>
+                      <a:r>
+                        <a:rPr lang="it-IT" sz="1050" dirty="0"/>
+                        <a:t>-id: Long</a:t>
+                      </a:r>
+                    </a:p>
+                    <a:p>
+                      <a:pPr marL="0" marR="0" lvl="0" indent="0" algn="l" defTabSz="914400" rtl="0" eaLnBrk="1" fontAlgn="auto" latinLnBrk="0" hangingPunct="1">
+                        <a:lnSpc>
+                          <a:spcPct val="100000"/>
+                        </a:lnSpc>
+                        <a:spcBef>
+                          <a:spcPts val="0"/>
+                        </a:spcBef>
+                        <a:spcAft>
+                          <a:spcPts val="0"/>
+                        </a:spcAft>
+                        <a:buClrTx/>
+                        <a:buSzTx/>
+                        <a:buFontTx/>
+                        <a:buNone/>
+                        <a:tabLst/>
+                        <a:defRPr/>
+                      </a:pPr>
+                      <a:r>
+                        <a:rPr lang="it-IT" sz="1050" dirty="0"/>
+                        <a:t>-</a:t>
+                      </a:r>
+                      <a:r>
+                        <a:rPr lang="it-IT" sz="1050" dirty="0" err="1"/>
+                        <a:t>userName</a:t>
+                      </a:r>
+                      <a:r>
+                        <a:rPr lang="it-IT" sz="1050" dirty="0"/>
+                        <a:t>: </a:t>
+                      </a:r>
+                      <a:r>
+                        <a:rPr lang="it-IT" sz="1050" dirty="0" err="1"/>
+                        <a:t>String</a:t>
+                      </a:r>
+                      <a:endParaRPr lang="it-IT" sz="1050" dirty="0"/>
+                    </a:p>
+                    <a:p>
+                      <a:r>
+                        <a:rPr lang="it-IT" sz="1050" dirty="0"/>
+                        <a:t>-password: </a:t>
+                      </a:r>
+                      <a:r>
+                        <a:rPr lang="it-IT" sz="1050" dirty="0" err="1"/>
+                        <a:t>String</a:t>
+                      </a:r>
+                      <a:endParaRPr lang="it-IT" sz="1050" dirty="0"/>
+                    </a:p>
+                    <a:p>
+                      <a:r>
+                        <a:rPr lang="it-IT" sz="1050" dirty="0"/>
+                        <a:t>-</a:t>
+                      </a:r>
+                      <a:r>
+                        <a:rPr lang="it-IT" sz="1050" dirty="0" err="1"/>
+                        <a:t>role</a:t>
+                      </a:r>
+                      <a:r>
+                        <a:rPr lang="it-IT" sz="1050" dirty="0"/>
+                        <a:t>: </a:t>
+                      </a:r>
+                      <a:r>
+                        <a:rPr lang="it-IT" sz="1050" dirty="0" err="1"/>
+                        <a:t>String</a:t>
+                      </a:r>
+                      <a:r>
+                        <a:rPr lang="it-IT" sz="1050" dirty="0"/>
+                        <a:t> </a:t>
+                      </a:r>
+                    </a:p>
+                    <a:p>
+                      <a:endParaRPr lang="it-IT" sz="1050" dirty="0"/>
+                    </a:p>
+                  </a:txBody>
+                  <a:tcPr>
+                    <a:lnL w="12700" cap="flat" cmpd="sng" algn="ctr">
+                      <a:solidFill>
+                        <a:scrgbClr r="0" g="0" b="0"/>
+                      </a:solidFill>
+                      <a:prstDash val="solid"/>
+                      <a:round/>
+                      <a:headEnd type="none" w="med" len="med"/>
+                      <a:tailEnd type="none" w="med" len="med"/>
+                    </a:lnL>
+                    <a:lnR w="12700" cap="flat" cmpd="sng" algn="ctr">
+                      <a:solidFill>
+                        <a:scrgbClr r="0" g="0" b="0"/>
+                      </a:solidFill>
+                      <a:prstDash val="solid"/>
+                      <a:round/>
+                      <a:headEnd type="none" w="med" len="med"/>
+                      <a:tailEnd type="none" w="med" len="med"/>
+                    </a:lnR>
+                    <a:lnB w="12700" cap="flat" cmpd="sng" algn="ctr">
+                      <a:solidFill>
+                        <a:scrgbClr r="0" g="0" b="0"/>
+                      </a:solidFill>
+                      <a:prstDash val="solid"/>
+                      <a:round/>
+                      <a:headEnd type="none" w="med" len="med"/>
+                      <a:tailEnd type="none" w="med" len="med"/>
+                    </a:lnB>
+                  </a:tcPr>
+                </a:tc>
+                <a:extLst>
+                  <a:ext uri="{0D108BD9-81ED-4DB2-BD59-A6C34878D82A}">
+                    <a16:rowId xmlns:a16="http://schemas.microsoft.com/office/drawing/2014/main" val="10001"/>
+                  </a:ext>
+                </a:extLst>
+              </a:tr>
+            </a:tbl>
+          </a:graphicData>
+        </a:graphic>
+      </p:graphicFrame>
+      <p:cxnSp>
+        <p:nvCxnSpPr>
+          <p:cNvPr id="46" name="Connettore 2 45">
+            <a:extLst>
+              <a:ext uri="{FF2B5EF4-FFF2-40B4-BE49-F238E27FC236}">
+                <a16:creationId xmlns:a16="http://schemas.microsoft.com/office/drawing/2014/main" id="{19A8E99F-D3BF-4A66-AFEC-E06BFADF3DD6}"/>
+              </a:ext>
+            </a:extLst>
+          </p:cNvPr>
+          <p:cNvCxnSpPr>
+            <a:cxnSpLocks/>
+          </p:cNvCxnSpPr>
+          <p:nvPr/>
+        </p:nvCxnSpPr>
+        <p:spPr>
+          <a:xfrm>
+            <a:off x="1843645" y="2482349"/>
+            <a:ext cx="0" cy="428270"/>
+          </a:xfrm>
+          <a:prstGeom prst="straightConnector1">
+            <a:avLst/>
+          </a:prstGeom>
+          <a:ln w="3175" cmpd="sng">
+            <a:solidFill>
+              <a:schemeClr val="tx1"/>
+            </a:solidFill>
+            <a:prstDash val="solid"/>
+            <a:headEnd type="none"/>
+            <a:tailEnd type="arrow"/>
+          </a:ln>
+        </p:spPr>
+        <p:style>
+          <a:lnRef idx="2">
+            <a:schemeClr val="accent1"/>
+          </a:lnRef>
+          <a:fillRef idx="0">
+            <a:schemeClr val="accent1"/>
+          </a:fillRef>
+          <a:effectRef idx="1">
+            <a:schemeClr val="accent1"/>
+          </a:effectRef>
+          <a:fontRef idx="minor">
+            <a:schemeClr val="tx1"/>
+          </a:fontRef>
+        </p:style>
+      </p:cxnSp>
+      <p:sp>
+        <p:nvSpPr>
+          <p:cNvPr id="48" name="CasellaDiTesto 47">
+            <a:extLst>
+              <a:ext uri="{FF2B5EF4-FFF2-40B4-BE49-F238E27FC236}">
+                <a16:creationId xmlns:a16="http://schemas.microsoft.com/office/drawing/2014/main" id="{01951D84-6025-4073-9286-2D604AE3464D}"/>
+              </a:ext>
+            </a:extLst>
+          </p:cNvPr>
+          <p:cNvSpPr txBox="1"/>
+          <p:nvPr/>
+        </p:nvSpPr>
+        <p:spPr>
+          <a:xfrm>
+            <a:off x="2900253" y="3751571"/>
+            <a:ext cx="301686" cy="369332"/>
+          </a:xfrm>
+          <a:prstGeom prst="rect">
+            <a:avLst/>
+          </a:prstGeom>
+          <a:noFill/>
+        </p:spPr>
+        <p:txBody>
+          <a:bodyPr wrap="none" rtlCol="0">
+            <a:spAutoFit/>
+          </a:bodyPr>
+          <a:lstStyle/>
+          <a:p>
+            <a:pPr defTabSz="457200"/>
+            <a:r>
+              <a:rPr lang="it-IT" dirty="0">
+                <a:solidFill>
+                  <a:prstClr val="black"/>
+                </a:solidFill>
+                <a:latin typeface="Calibri"/>
+              </a:rPr>
+              <a:t>1</a:t>
+            </a:r>
+          </a:p>
+        </p:txBody>
+      </p:sp>
+      <p:sp>
+        <p:nvSpPr>
+          <p:cNvPr id="50" name="CasellaDiTesto 49">
+            <a:extLst>
+              <a:ext uri="{FF2B5EF4-FFF2-40B4-BE49-F238E27FC236}">
+                <a16:creationId xmlns:a16="http://schemas.microsoft.com/office/drawing/2014/main" id="{DC58A6A4-CF4E-4B7D-9234-AE458F0C78DA}"/>
+              </a:ext>
+            </a:extLst>
+          </p:cNvPr>
+          <p:cNvSpPr txBox="1"/>
+          <p:nvPr/>
+        </p:nvSpPr>
+        <p:spPr>
+          <a:xfrm>
+            <a:off x="841647" y="2675803"/>
+            <a:ext cx="1354747" cy="461665"/>
+          </a:xfrm>
+          <a:prstGeom prst="rect">
+            <a:avLst/>
+          </a:prstGeom>
+          <a:noFill/>
+        </p:spPr>
+        <p:txBody>
+          <a:bodyPr wrap="square" rtlCol="0">
+            <a:spAutoFit/>
+          </a:bodyPr>
+          <a:lstStyle/>
+          <a:p>
+            <a:r>
+              <a:rPr lang="it-IT" sz="1200" dirty="0" err="1"/>
+              <a:t>Fetch</a:t>
+            </a:r>
+            <a:r>
+              <a:rPr lang="it-IT" sz="1200" dirty="0"/>
+              <a:t>: EAGER</a:t>
+            </a:r>
+          </a:p>
+          <a:p>
+            <a:endParaRPr lang="it-IT" sz="1200" dirty="0"/>
           </a:p>
         </p:txBody>
       </p:sp>

</xml_diff>